<commit_message>
Presentation ¶ Report refinment
Refined presentation: edited a few slides, added a couple for clarity.
Refined report: small edits and grammar / spell checks.
</commit_message>
<xml_diff>
--- a/presentation.pptx
+++ b/presentation.pptx
@@ -5,14 +5,16 @@
     <p:sldMasterId id="2147483778" r:id="rId1"/>
   </p:sldMasterIdLst>
   <p:notesMasterIdLst>
-    <p:notesMasterId r:id="rId7"/>
+    <p:notesMasterId r:id="rId9"/>
   </p:notesMasterIdLst>
   <p:sldIdLst>
     <p:sldId id="256" r:id="rId2"/>
-    <p:sldId id="257" r:id="rId3"/>
-    <p:sldId id="258" r:id="rId4"/>
-    <p:sldId id="261" r:id="rId5"/>
-    <p:sldId id="259" r:id="rId6"/>
+    <p:sldId id="262" r:id="rId3"/>
+    <p:sldId id="257" r:id="rId4"/>
+    <p:sldId id="258" r:id="rId5"/>
+    <p:sldId id="263" r:id="rId6"/>
+    <p:sldId id="261" r:id="rId7"/>
+    <p:sldId id="259" r:id="rId8"/>
   </p:sldIdLst>
   <p:sldSz cx="12192000" cy="6858000"/>
   <p:notesSz cx="6858000" cy="9144000"/>
@@ -111,6 +113,11 @@
       </a:defRPr>
     </a:lvl9pPr>
   </p:defaultTextStyle>
+  <p:extLst>
+    <p:ext uri="{EFAFB233-063F-42B5-8137-9DF3F51BA10A}">
+      <p15:sldGuideLst xmlns:p15="http://schemas.microsoft.com/office/powerpoint/2012/main"/>
+    </p:ext>
+  </p:extLst>
 </p:presentation>
 </file>
 
@@ -196,7 +203,7 @@
           <a:p>
             <a:fld id="{4ADB71B1-4B87-5F4C-A857-0D9BC1A0DCB0}" type="datetimeFigureOut">
               <a:rPr lang="en-US" smtClean="0"/>
-              <a:t>12/16/19</a:t>
+              <a:t>12/17/19</a:t>
             </a:fld>
             <a:endParaRPr lang="en-US"/>
           </a:p>
@@ -507,6 +514,23 @@
           <a:bodyPr/>
           <a:lstStyle/>
           <a:p>
+            <a:pPr marL="0" marR="0" lvl="0" indent="0" algn="l" defTabSz="914400" rtl="0" eaLnBrk="1" fontAlgn="auto" latinLnBrk="0" hangingPunct="1">
+              <a:lnSpc>
+                <a:spcPct val="100000"/>
+              </a:lnSpc>
+              <a:spcBef>
+                <a:spcPts val="0"/>
+              </a:spcBef>
+              <a:spcAft>
+                <a:spcPts val="0"/>
+              </a:spcAft>
+              <a:buClrTx/>
+              <a:buSzTx/>
+              <a:buFontTx/>
+              <a:buNone/>
+              <a:tabLst/>
+              <a:defRPr/>
+            </a:pPr>
             <a:r>
               <a:rPr lang="en-US" sz="1200" kern="1200" dirty="0">
                 <a:solidFill>
@@ -517,16 +541,10 @@
                 <a:ea typeface="+mn-ea"/>
                 <a:cs typeface="+mn-cs"/>
               </a:rPr>
-              <a:t>The purpose of this project was to create a command-line tool of various functions used to work with Excel files. These functions include:</a:t>
-            </a:r>
-          </a:p>
-          <a:p>
-            <a:pPr marL="628650" lvl="1" indent="-171450">
-              <a:buFont typeface="Arial" panose="020B0604020202020204" pitchFamily="34" charset="0"/>
-              <a:buChar char="•"/>
-            </a:pPr>
-            <a:r>
-              <a:rPr lang="en-US" sz="1200" kern="1200" dirty="0">
+              <a:t>There exist many tools and projects that utilize Python to read and manipulate excel files -  </a:t>
+            </a:r>
+            <a:r>
+              <a:rPr lang="en-US" sz="1200" kern="1200" dirty="0" err="1">
                 <a:solidFill>
                   <a:schemeClr val="tx1"/>
                 </a:solidFill>
@@ -535,14 +553,8 @@
                 <a:ea typeface="+mn-ea"/>
                 <a:cs typeface="+mn-cs"/>
               </a:rPr>
-              <a:t>Importing / exporting Excel files from csv</a:t>
-            </a:r>
-          </a:p>
-          <a:p>
-            <a:pPr marL="628650" lvl="1" indent="-171450">
-              <a:buFont typeface="Arial" panose="020B0604020202020204" pitchFamily="34" charset="0"/>
-              <a:buChar char="•"/>
-            </a:pPr>
+              <a:t>OpenPyXl</a:t>
+            </a:r>
             <a:r>
               <a:rPr lang="en-US" sz="1200" kern="1200" dirty="0">
                 <a:solidFill>
@@ -553,14 +565,21 @@
                 <a:ea typeface="+mn-ea"/>
                 <a:cs typeface="+mn-cs"/>
               </a:rPr>
-              <a:t>Data validation and cleanup features for common cleanup functions (phone numbers, email addresses, state codes, zip codes, dates, web addresses, character limits, etc.)</a:t>
-            </a:r>
-          </a:p>
-          <a:p>
-            <a:pPr marL="628650" lvl="1" indent="-171450">
-              <a:buFont typeface="Arial" panose="020B0604020202020204" pitchFamily="34" charset="0"/>
-              <a:buChar char="•"/>
-            </a:pPr>
+              <a:t>, pandas, NumPy, matplotlib, and various others prove themselves powerful. However, a user who is unfamiliar with python or coding may have difficulty making use of these tools. A general user driven design, such as some features of </a:t>
+            </a:r>
+            <a:r>
+              <a:rPr lang="en-US" sz="1200" u="sng" kern="1200" dirty="0">
+                <a:solidFill>
+                  <a:schemeClr val="tx1"/>
+                </a:solidFill>
+                <a:effectLst/>
+                <a:latin typeface="+mn-lt"/>
+                <a:ea typeface="+mn-ea"/>
+                <a:cs typeface="+mn-cs"/>
+                <a:hlinkClick r:id="rId3"/>
+              </a:rPr>
+              <a:t>Pyexcel</a:t>
+            </a:r>
             <a:r>
               <a:rPr lang="en-US" sz="1200" kern="1200" dirty="0">
                 <a:solidFill>
@@ -571,13 +590,54 @@
                 <a:ea typeface="+mn-ea"/>
                 <a:cs typeface="+mn-cs"/>
               </a:rPr>
-              <a:t>Compressing files</a:t>
-            </a:r>
-          </a:p>
-          <a:p>
-            <a:pPr marL="628650" lvl="1" indent="-171450">
-              <a:buFont typeface="Arial" panose="020B0604020202020204" pitchFamily="34" charset="0"/>
-              <a:buChar char="•"/>
+              <a:t>, allow users with very little coding experience to export and import excel files with an interface that opens in a browser. Likewise, this project aims to create a navigable command line interface for general users (with little to no programming experience) to still make use of some of these helpful excel utilities. </a:t>
+            </a:r>
+          </a:p>
+          <a:p>
+            <a:pPr marL="0" marR="0" lvl="0" indent="0" algn="l" defTabSz="914400" rtl="0" eaLnBrk="1" fontAlgn="auto" latinLnBrk="0" hangingPunct="1">
+              <a:lnSpc>
+                <a:spcPct val="100000"/>
+              </a:lnSpc>
+              <a:spcBef>
+                <a:spcPts val="0"/>
+              </a:spcBef>
+              <a:spcAft>
+                <a:spcPts val="0"/>
+              </a:spcAft>
+              <a:buClrTx/>
+              <a:buSzTx/>
+              <a:buFontTx/>
+              <a:buNone/>
+              <a:tabLst/>
+              <a:defRPr/>
+            </a:pPr>
+            <a:endParaRPr lang="en-US" sz="1200" kern="1200" dirty="0">
+              <a:solidFill>
+                <a:schemeClr val="tx1"/>
+              </a:solidFill>
+              <a:effectLst/>
+              <a:latin typeface="+mn-lt"/>
+              <a:ea typeface="+mn-ea"/>
+              <a:cs typeface="+mn-cs"/>
+            </a:endParaRPr>
+          </a:p>
+          <a:p>
+            <a:pPr marL="0" marR="0" lvl="0" indent="0" algn="l" defTabSz="914400" rtl="0" eaLnBrk="1" fontAlgn="auto" latinLnBrk="0" hangingPunct="1">
+              <a:lnSpc>
+                <a:spcPct val="100000"/>
+              </a:lnSpc>
+              <a:spcBef>
+                <a:spcPts val="0"/>
+              </a:spcBef>
+              <a:spcAft>
+                <a:spcPts val="0"/>
+              </a:spcAft>
+              <a:buClrTx/>
+              <a:buSzTx/>
+              <a:buFontTx/>
+              <a:buNone/>
+              <a:tabLst/>
+              <a:defRPr/>
             </a:pPr>
             <a:r>
               <a:rPr lang="en-US" sz="1200" kern="1200" dirty="0">
@@ -589,47 +649,8 @@
                 <a:ea typeface="+mn-ea"/>
                 <a:cs typeface="+mn-cs"/>
               </a:rPr>
-              <a:t>Sending a copy of a file to a list of email addresses</a:t>
-            </a:r>
-          </a:p>
-          <a:p>
-            <a:pPr marL="628650" lvl="1" indent="-171450">
-              <a:buFont typeface="Arial" panose="020B0604020202020204" pitchFamily="34" charset="0"/>
-              <a:buChar char="•"/>
-            </a:pPr>
-            <a:r>
-              <a:rPr lang="en-US" sz="1200" kern="1200" dirty="0">
-                <a:solidFill>
-                  <a:schemeClr val="tx1"/>
-                </a:solidFill>
-                <a:effectLst/>
-                <a:latin typeface="+mn-lt"/>
-                <a:ea typeface="+mn-ea"/>
-                <a:cs typeface="+mn-cs"/>
-              </a:rPr>
-              <a:t>Removing duplicate rows based on a set of criteria</a:t>
-            </a:r>
-          </a:p>
-          <a:p>
-            <a:pPr marL="628650" lvl="1" indent="-171450">
-              <a:buFont typeface="Arial" panose="020B0604020202020204" pitchFamily="34" charset="0"/>
-              <a:buChar char="•"/>
-            </a:pPr>
-            <a:r>
-              <a:rPr lang="en-US" sz="1200" kern="1200" dirty="0">
-                <a:solidFill>
-                  <a:schemeClr val="tx1"/>
-                </a:solidFill>
-                <a:effectLst/>
-                <a:latin typeface="+mn-lt"/>
-                <a:ea typeface="+mn-ea"/>
-                <a:cs typeface="+mn-cs"/>
-              </a:rPr>
-              <a:t>Data Analysis: Sum, Count, Max, Min, Unique Values, Average, etc.</a:t>
-            </a:r>
-          </a:p>
-          <a:p>
-            <a:endParaRPr lang="en-US" dirty="0"/>
+              <a:t>Our project is intended for those looking for a tool to quickly clean and manipulate large excel files.</a:t>
+            </a:r>
           </a:p>
         </p:txBody>
       </p:sp>
@@ -659,7 +680,7 @@
     </p:spTree>
     <p:extLst>
       <p:ext uri="{BB962C8B-B14F-4D97-AF65-F5344CB8AC3E}">
-        <p14:creationId xmlns:p14="http://schemas.microsoft.com/office/powerpoint/2010/main" val="4253605118"/>
+        <p14:creationId xmlns:p14="http://schemas.microsoft.com/office/powerpoint/2010/main" val="3339269267"/>
       </p:ext>
     </p:extLst>
   </p:cSld>
@@ -723,10 +744,16 @@
                 <a:ea typeface="+mn-ea"/>
                 <a:cs typeface="+mn-cs"/>
               </a:rPr>
-              <a:t>In order to launch the utility, one will have to execute </a:t>
-            </a:r>
-            <a:r>
-              <a:rPr lang="en-US" sz="1200" kern="1200" dirty="0" err="1">
+              <a:t>The purpose of this project was to create a command-line tool of various functions used to work with Excel files. These functions include:</a:t>
+            </a:r>
+          </a:p>
+          <a:p>
+            <a:pPr marL="628650" lvl="1" indent="-171450">
+              <a:buFont typeface="Arial" panose="020B0604020202020204" pitchFamily="34" charset="0"/>
+              <a:buChar char="•"/>
+            </a:pPr>
+            <a:r>
+              <a:rPr lang="en-US" sz="1200" kern="1200" dirty="0">
                 <a:solidFill>
                   <a:schemeClr val="tx1"/>
                 </a:solidFill>
@@ -735,8 +762,14 @@
                 <a:ea typeface="+mn-ea"/>
                 <a:cs typeface="+mn-cs"/>
               </a:rPr>
-              <a:t>main.py</a:t>
-            </a:r>
+              <a:t>Importing / exporting Excel files from csv</a:t>
+            </a:r>
+          </a:p>
+          <a:p>
+            <a:pPr marL="628650" lvl="1" indent="-171450">
+              <a:buFont typeface="Arial" panose="020B0604020202020204" pitchFamily="34" charset="0"/>
+              <a:buChar char="•"/>
+            </a:pPr>
             <a:r>
               <a:rPr lang="en-US" sz="1200" kern="1200" dirty="0">
                 <a:solidFill>
@@ -747,10 +780,16 @@
                 <a:ea typeface="+mn-ea"/>
                 <a:cs typeface="+mn-cs"/>
               </a:rPr>
-              <a:t>. From there, the user will be directed to their desired tool whereupon completion will direct them back to main. The flow of the program is based on the file “</a:t>
-            </a:r>
-            <a:r>
-              <a:rPr lang="en-US" sz="1200" kern="1200" dirty="0" err="1">
+              <a:t>Data validation and cleanup features for common cleanup functions (phone numbers, email addresses, state codes, zip codes, dates, web addresses, character limits, etc.)</a:t>
+            </a:r>
+          </a:p>
+          <a:p>
+            <a:pPr marL="628650" lvl="1" indent="-171450">
+              <a:buFont typeface="Arial" panose="020B0604020202020204" pitchFamily="34" charset="0"/>
+              <a:buChar char="•"/>
+            </a:pPr>
+            <a:r>
+              <a:rPr lang="en-US" sz="1200" kern="1200" dirty="0">
                 <a:solidFill>
                   <a:schemeClr val="tx1"/>
                 </a:solidFill>
@@ -759,8 +798,14 @@
                 <a:ea typeface="+mn-ea"/>
                 <a:cs typeface="+mn-cs"/>
               </a:rPr>
-              <a:t>menus.py</a:t>
-            </a:r>
+              <a:t>Compressing files</a:t>
+            </a:r>
+          </a:p>
+          <a:p>
+            <a:pPr marL="628650" lvl="1" indent="-171450">
+              <a:buFont typeface="Arial" panose="020B0604020202020204" pitchFamily="34" charset="0"/>
+              <a:buChar char="•"/>
+            </a:pPr>
             <a:r>
               <a:rPr lang="en-US" sz="1200" kern="1200" dirty="0">
                 <a:solidFill>
@@ -771,10 +816,14 @@
                 <a:ea typeface="+mn-ea"/>
                 <a:cs typeface="+mn-cs"/>
               </a:rPr>
-              <a:t>,” which utilizes a class to navigate the entire program. When the user reaches a key tool or file, a menus object is created where a description and options are provided based on this menus class.</a:t>
-            </a:r>
-          </a:p>
-          <a:p>
+              <a:t>Sending a copy of a file to a list of email addresses</a:t>
+            </a:r>
+          </a:p>
+          <a:p>
+            <a:pPr marL="628650" lvl="1" indent="-171450">
+              <a:buFont typeface="Arial" panose="020B0604020202020204" pitchFamily="34" charset="0"/>
+              <a:buChar char="•"/>
+            </a:pPr>
             <a:r>
               <a:rPr lang="en-US" sz="1200" kern="1200" dirty="0">
                 <a:solidFill>
@@ -785,10 +834,14 @@
                 <a:ea typeface="+mn-ea"/>
                 <a:cs typeface="+mn-cs"/>
               </a:rPr>
-              <a:t> </a:t>
-            </a:r>
-          </a:p>
-          <a:p>
+              <a:t>Removing duplicate rows based on a set of criteria</a:t>
+            </a:r>
+          </a:p>
+          <a:p>
+            <a:pPr marL="628650" lvl="1" indent="-171450">
+              <a:buFont typeface="Arial" panose="020B0604020202020204" pitchFamily="34" charset="0"/>
+              <a:buChar char="•"/>
+            </a:pPr>
             <a:r>
               <a:rPr lang="en-US" sz="1200" kern="1200" dirty="0">
                 <a:solidFill>
@@ -799,103 +852,7 @@
                 <a:ea typeface="+mn-ea"/>
                 <a:cs typeface="+mn-cs"/>
               </a:rPr>
-              <a:t>This project is dependent on the following, which has no check as of now: </a:t>
-            </a:r>
-            <a:r>
-              <a:rPr lang="en-US" sz="1200" kern="1200" dirty="0" err="1">
-                <a:solidFill>
-                  <a:schemeClr val="tx1"/>
-                </a:solidFill>
-                <a:effectLst/>
-                <a:latin typeface="+mn-lt"/>
-                <a:ea typeface="+mn-ea"/>
-                <a:cs typeface="+mn-cs"/>
-              </a:rPr>
-              <a:t>openpyxl</a:t>
-            </a:r>
-            <a:r>
-              <a:rPr lang="en-US" sz="1200" kern="1200" dirty="0">
-                <a:solidFill>
-                  <a:schemeClr val="tx1"/>
-                </a:solidFill>
-                <a:effectLst/>
-                <a:latin typeface="+mn-lt"/>
-                <a:ea typeface="+mn-ea"/>
-                <a:cs typeface="+mn-cs"/>
-              </a:rPr>
-              <a:t>, pandas, matplotlib, </a:t>
-            </a:r>
-            <a:r>
-              <a:rPr lang="en-US" sz="1200" kern="1200" dirty="0" err="1">
-                <a:solidFill>
-                  <a:schemeClr val="tx1"/>
-                </a:solidFill>
-                <a:effectLst/>
-                <a:latin typeface="+mn-lt"/>
-                <a:ea typeface="+mn-ea"/>
-                <a:cs typeface="+mn-cs"/>
-              </a:rPr>
-              <a:t>numpy</a:t>
-            </a:r>
-            <a:r>
-              <a:rPr lang="en-US" sz="1200" kern="1200" dirty="0">
-                <a:solidFill>
-                  <a:schemeClr val="tx1"/>
-                </a:solidFill>
-                <a:effectLst/>
-                <a:latin typeface="+mn-lt"/>
-                <a:ea typeface="+mn-ea"/>
-                <a:cs typeface="+mn-cs"/>
-              </a:rPr>
-              <a:t>, </a:t>
-            </a:r>
-            <a:r>
-              <a:rPr lang="en-US" sz="1200" kern="1200" dirty="0" err="1">
-                <a:solidFill>
-                  <a:schemeClr val="tx1"/>
-                </a:solidFill>
-                <a:effectLst/>
-                <a:latin typeface="+mn-lt"/>
-                <a:ea typeface="+mn-ea"/>
-                <a:cs typeface="+mn-cs"/>
-              </a:rPr>
-              <a:t>importlib</a:t>
-            </a:r>
-            <a:r>
-              <a:rPr lang="en-US" sz="1200" kern="1200" dirty="0">
-                <a:solidFill>
-                  <a:schemeClr val="tx1"/>
-                </a:solidFill>
-                <a:effectLst/>
-                <a:latin typeface="+mn-lt"/>
-                <a:ea typeface="+mn-ea"/>
-                <a:cs typeface="+mn-cs"/>
-              </a:rPr>
-              <a:t>, and </a:t>
-            </a:r>
-            <a:r>
-              <a:rPr lang="en-US" sz="1200" kern="1200" dirty="0" err="1">
-                <a:solidFill>
-                  <a:schemeClr val="tx1"/>
-                </a:solidFill>
-                <a:effectLst/>
-                <a:latin typeface="+mn-lt"/>
-                <a:ea typeface="+mn-ea"/>
-                <a:cs typeface="+mn-cs"/>
-              </a:rPr>
-              <a:t>smtplib</a:t>
-            </a:r>
-            <a:r>
-              <a:rPr lang="en-US" sz="1200" kern="1200" dirty="0">
-                <a:solidFill>
-                  <a:schemeClr val="tx1"/>
-                </a:solidFill>
-                <a:effectLst/>
-                <a:latin typeface="+mn-lt"/>
-                <a:ea typeface="+mn-ea"/>
-                <a:cs typeface="+mn-cs"/>
-              </a:rPr>
-              <a:t>. Ideally, the program would check if these imports are found and ask the user to install if they are not already installed.</a:t>
+              <a:t>Data Analysis: Sum, Count, Max, Min, Unique Values, Average, etc.</a:t>
             </a:r>
           </a:p>
           <a:p>
@@ -929,7 +886,7 @@
     </p:spTree>
     <p:extLst>
       <p:ext uri="{BB962C8B-B14F-4D97-AF65-F5344CB8AC3E}">
-        <p14:creationId xmlns:p14="http://schemas.microsoft.com/office/powerpoint/2010/main" val="788796349"/>
+        <p14:creationId xmlns:p14="http://schemas.microsoft.com/office/powerpoint/2010/main" val="4253605118"/>
       </p:ext>
     </p:extLst>
   </p:cSld>
@@ -983,6 +940,360 @@
           <a:bodyPr/>
           <a:lstStyle/>
           <a:p>
+            <a:r>
+              <a:rPr lang="en-US" sz="1200" kern="1200" dirty="0">
+                <a:solidFill>
+                  <a:schemeClr val="tx1"/>
+                </a:solidFill>
+                <a:effectLst/>
+                <a:latin typeface="+mn-lt"/>
+                <a:ea typeface="+mn-ea"/>
+                <a:cs typeface="+mn-cs"/>
+              </a:rPr>
+              <a:t>In order to launch the utility, one will have to execute </a:t>
+            </a:r>
+            <a:r>
+              <a:rPr lang="en-US" sz="1200" kern="1200" dirty="0" err="1">
+                <a:solidFill>
+                  <a:schemeClr val="tx1"/>
+                </a:solidFill>
+                <a:effectLst/>
+                <a:latin typeface="+mn-lt"/>
+                <a:ea typeface="+mn-ea"/>
+                <a:cs typeface="+mn-cs"/>
+              </a:rPr>
+              <a:t>main.py</a:t>
+            </a:r>
+            <a:r>
+              <a:rPr lang="en-US" sz="1200" kern="1200" dirty="0">
+                <a:solidFill>
+                  <a:schemeClr val="tx1"/>
+                </a:solidFill>
+                <a:effectLst/>
+                <a:latin typeface="+mn-lt"/>
+                <a:ea typeface="+mn-ea"/>
+                <a:cs typeface="+mn-cs"/>
+              </a:rPr>
+              <a:t>. From there, the user will be directed to their desired tool whereupon completion will direct them back to main. The flow of the program is based on the file “</a:t>
+            </a:r>
+            <a:r>
+              <a:rPr lang="en-US" sz="1200" kern="1200" dirty="0" err="1">
+                <a:solidFill>
+                  <a:schemeClr val="tx1"/>
+                </a:solidFill>
+                <a:effectLst/>
+                <a:latin typeface="+mn-lt"/>
+                <a:ea typeface="+mn-ea"/>
+                <a:cs typeface="+mn-cs"/>
+              </a:rPr>
+              <a:t>menus.py</a:t>
+            </a:r>
+            <a:r>
+              <a:rPr lang="en-US" sz="1200" kern="1200" dirty="0">
+                <a:solidFill>
+                  <a:schemeClr val="tx1"/>
+                </a:solidFill>
+                <a:effectLst/>
+                <a:latin typeface="+mn-lt"/>
+                <a:ea typeface="+mn-ea"/>
+                <a:cs typeface="+mn-cs"/>
+              </a:rPr>
+              <a:t>,” which utilizes a class to navigate the entire program. When the user reaches a key tool or file, a menus object is created where a description and options are provided based on this menus class.</a:t>
+            </a:r>
+          </a:p>
+          <a:p>
+            <a:r>
+              <a:rPr lang="en-US" sz="1200" kern="1200" dirty="0">
+                <a:solidFill>
+                  <a:schemeClr val="tx1"/>
+                </a:solidFill>
+                <a:effectLst/>
+                <a:latin typeface="+mn-lt"/>
+                <a:ea typeface="+mn-ea"/>
+                <a:cs typeface="+mn-cs"/>
+              </a:rPr>
+              <a:t> </a:t>
+            </a:r>
+          </a:p>
+          <a:p>
+            <a:r>
+              <a:rPr lang="en-US" sz="1200" kern="1200" dirty="0">
+                <a:solidFill>
+                  <a:schemeClr val="tx1"/>
+                </a:solidFill>
+                <a:effectLst/>
+                <a:latin typeface="+mn-lt"/>
+                <a:ea typeface="+mn-ea"/>
+                <a:cs typeface="+mn-cs"/>
+              </a:rPr>
+              <a:t>This project is dependent on the following, which has no check as of now: </a:t>
+            </a:r>
+            <a:r>
+              <a:rPr lang="en-US" sz="1200" kern="1200" dirty="0" err="1">
+                <a:solidFill>
+                  <a:schemeClr val="tx1"/>
+                </a:solidFill>
+                <a:effectLst/>
+                <a:latin typeface="+mn-lt"/>
+                <a:ea typeface="+mn-ea"/>
+                <a:cs typeface="+mn-cs"/>
+              </a:rPr>
+              <a:t>openpyxl</a:t>
+            </a:r>
+            <a:r>
+              <a:rPr lang="en-US" sz="1200" kern="1200" dirty="0">
+                <a:solidFill>
+                  <a:schemeClr val="tx1"/>
+                </a:solidFill>
+                <a:effectLst/>
+                <a:latin typeface="+mn-lt"/>
+                <a:ea typeface="+mn-ea"/>
+                <a:cs typeface="+mn-cs"/>
+              </a:rPr>
+              <a:t>, pandas, matplotlib, </a:t>
+            </a:r>
+            <a:r>
+              <a:rPr lang="en-US" sz="1200" kern="1200" dirty="0" err="1">
+                <a:solidFill>
+                  <a:schemeClr val="tx1"/>
+                </a:solidFill>
+                <a:effectLst/>
+                <a:latin typeface="+mn-lt"/>
+                <a:ea typeface="+mn-ea"/>
+                <a:cs typeface="+mn-cs"/>
+              </a:rPr>
+              <a:t>numpy</a:t>
+            </a:r>
+            <a:r>
+              <a:rPr lang="en-US" sz="1200" kern="1200" dirty="0">
+                <a:solidFill>
+                  <a:schemeClr val="tx1"/>
+                </a:solidFill>
+                <a:effectLst/>
+                <a:latin typeface="+mn-lt"/>
+                <a:ea typeface="+mn-ea"/>
+                <a:cs typeface="+mn-cs"/>
+              </a:rPr>
+              <a:t>, </a:t>
+            </a:r>
+            <a:r>
+              <a:rPr lang="en-US" sz="1200" kern="1200" dirty="0" err="1">
+                <a:solidFill>
+                  <a:schemeClr val="tx1"/>
+                </a:solidFill>
+                <a:effectLst/>
+                <a:latin typeface="+mn-lt"/>
+                <a:ea typeface="+mn-ea"/>
+                <a:cs typeface="+mn-cs"/>
+              </a:rPr>
+              <a:t>importlib</a:t>
+            </a:r>
+            <a:r>
+              <a:rPr lang="en-US" sz="1200" kern="1200" dirty="0">
+                <a:solidFill>
+                  <a:schemeClr val="tx1"/>
+                </a:solidFill>
+                <a:effectLst/>
+                <a:latin typeface="+mn-lt"/>
+                <a:ea typeface="+mn-ea"/>
+                <a:cs typeface="+mn-cs"/>
+              </a:rPr>
+              <a:t>, and </a:t>
+            </a:r>
+            <a:r>
+              <a:rPr lang="en-US" sz="1200" kern="1200" dirty="0" err="1">
+                <a:solidFill>
+                  <a:schemeClr val="tx1"/>
+                </a:solidFill>
+                <a:effectLst/>
+                <a:latin typeface="+mn-lt"/>
+                <a:ea typeface="+mn-ea"/>
+                <a:cs typeface="+mn-cs"/>
+              </a:rPr>
+              <a:t>smtplib</a:t>
+            </a:r>
+            <a:r>
+              <a:rPr lang="en-US" sz="1200" kern="1200" dirty="0">
+                <a:solidFill>
+                  <a:schemeClr val="tx1"/>
+                </a:solidFill>
+                <a:effectLst/>
+                <a:latin typeface="+mn-lt"/>
+                <a:ea typeface="+mn-ea"/>
+                <a:cs typeface="+mn-cs"/>
+              </a:rPr>
+              <a:t>. Ideally, the program would check if these imports are found and ask the user to install if they are not already installed.</a:t>
+            </a:r>
+          </a:p>
+          <a:p>
+            <a:endParaRPr lang="en-US" dirty="0"/>
+          </a:p>
+        </p:txBody>
+      </p:sp>
+      <p:sp>
+        <p:nvSpPr>
+          <p:cNvPr id="4" name="Slide Number Placeholder 3"/>
+          <p:cNvSpPr>
+            <a:spLocks noGrp="1"/>
+          </p:cNvSpPr>
+          <p:nvPr>
+            <p:ph type="sldNum" sz="quarter" idx="5"/>
+          </p:nvPr>
+        </p:nvSpPr>
+        <p:spPr/>
+        <p:txBody>
+          <a:bodyPr/>
+          <a:lstStyle/>
+          <a:p>
+            <a:fld id="{807F441D-149E-EA40-A4B4-DBE54466C197}" type="slidenum">
+              <a:rPr lang="en-US" smtClean="0"/>
+              <a:t>4</a:t>
+            </a:fld>
+            <a:endParaRPr lang="en-US"/>
+          </a:p>
+        </p:txBody>
+      </p:sp>
+    </p:spTree>
+    <p:extLst>
+      <p:ext uri="{BB962C8B-B14F-4D97-AF65-F5344CB8AC3E}">
+        <p14:creationId xmlns:p14="http://schemas.microsoft.com/office/powerpoint/2010/main" val="788796349"/>
+      </p:ext>
+    </p:extLst>
+  </p:cSld>
+  <p:clrMapOvr>
+    <a:masterClrMapping/>
+  </p:clrMapOvr>
+</p:notes>
+</file>
+
+<file path=ppt/notesSlides/notesSlide4.xml><?xml version="1.0" encoding="utf-8"?>
+<p:notes xmlns:a="http://schemas.openxmlformats.org/drawingml/2006/main" xmlns:r="http://schemas.openxmlformats.org/officeDocument/2006/relationships" xmlns:p="http://schemas.openxmlformats.org/presentationml/2006/main">
+  <p:cSld>
+    <p:spTree>
+      <p:nvGrpSpPr>
+        <p:cNvPr id="1" name=""/>
+        <p:cNvGrpSpPr/>
+        <p:nvPr/>
+      </p:nvGrpSpPr>
+      <p:grpSpPr>
+        <a:xfrm>
+          <a:off x="0" y="0"/>
+          <a:ext cx="0" cy="0"/>
+          <a:chOff x="0" y="0"/>
+          <a:chExt cx="0" cy="0"/>
+        </a:xfrm>
+      </p:grpSpPr>
+      <p:sp>
+        <p:nvSpPr>
+          <p:cNvPr id="2" name="Slide Image Placeholder 1"/>
+          <p:cNvSpPr>
+            <a:spLocks noGrp="1" noRot="1" noChangeAspect="1"/>
+          </p:cNvSpPr>
+          <p:nvPr>
+            <p:ph type="sldImg"/>
+          </p:nvPr>
+        </p:nvSpPr>
+        <p:spPr/>
+      </p:sp>
+      <p:sp>
+        <p:nvSpPr>
+          <p:cNvPr id="3" name="Notes Placeholder 2"/>
+          <p:cNvSpPr>
+            <a:spLocks noGrp="1"/>
+          </p:cNvSpPr>
+          <p:nvPr>
+            <p:ph type="body" idx="1"/>
+          </p:nvPr>
+        </p:nvSpPr>
+        <p:spPr/>
+        <p:txBody>
+          <a:bodyPr/>
+          <a:lstStyle/>
+          <a:p>
+            <a:endParaRPr lang="en-US" dirty="0"/>
+          </a:p>
+        </p:txBody>
+      </p:sp>
+      <p:sp>
+        <p:nvSpPr>
+          <p:cNvPr id="4" name="Slide Number Placeholder 3"/>
+          <p:cNvSpPr>
+            <a:spLocks noGrp="1"/>
+          </p:cNvSpPr>
+          <p:nvPr>
+            <p:ph type="sldNum" sz="quarter" idx="5"/>
+          </p:nvPr>
+        </p:nvSpPr>
+        <p:spPr/>
+        <p:txBody>
+          <a:bodyPr/>
+          <a:lstStyle/>
+          <a:p>
+            <a:fld id="{807F441D-149E-EA40-A4B4-DBE54466C197}" type="slidenum">
+              <a:rPr lang="en-US" smtClean="0"/>
+              <a:t>5</a:t>
+            </a:fld>
+            <a:endParaRPr lang="en-US"/>
+          </a:p>
+        </p:txBody>
+      </p:sp>
+    </p:spTree>
+    <p:extLst>
+      <p:ext uri="{BB962C8B-B14F-4D97-AF65-F5344CB8AC3E}">
+        <p14:creationId xmlns:p14="http://schemas.microsoft.com/office/powerpoint/2010/main" val="1740441821"/>
+      </p:ext>
+    </p:extLst>
+  </p:cSld>
+  <p:clrMapOvr>
+    <a:masterClrMapping/>
+  </p:clrMapOvr>
+</p:notes>
+</file>
+
+<file path=ppt/notesSlides/notesSlide5.xml><?xml version="1.0" encoding="utf-8"?>
+<p:notes xmlns:a="http://schemas.openxmlformats.org/drawingml/2006/main" xmlns:r="http://schemas.openxmlformats.org/officeDocument/2006/relationships" xmlns:p="http://schemas.openxmlformats.org/presentationml/2006/main">
+  <p:cSld>
+    <p:spTree>
+      <p:nvGrpSpPr>
+        <p:cNvPr id="1" name=""/>
+        <p:cNvGrpSpPr/>
+        <p:nvPr/>
+      </p:nvGrpSpPr>
+      <p:grpSpPr>
+        <a:xfrm>
+          <a:off x="0" y="0"/>
+          <a:ext cx="0" cy="0"/>
+          <a:chOff x="0" y="0"/>
+          <a:chExt cx="0" cy="0"/>
+        </a:xfrm>
+      </p:grpSpPr>
+      <p:sp>
+        <p:nvSpPr>
+          <p:cNvPr id="2" name="Slide Image Placeholder 1"/>
+          <p:cNvSpPr>
+            <a:spLocks noGrp="1" noRot="1" noChangeAspect="1"/>
+          </p:cNvSpPr>
+          <p:nvPr>
+            <p:ph type="sldImg"/>
+          </p:nvPr>
+        </p:nvSpPr>
+        <p:spPr/>
+      </p:sp>
+      <p:sp>
+        <p:nvSpPr>
+          <p:cNvPr id="3" name="Notes Placeholder 2"/>
+          <p:cNvSpPr>
+            <a:spLocks noGrp="1"/>
+          </p:cNvSpPr>
+          <p:nvPr>
+            <p:ph type="body" idx="1"/>
+          </p:nvPr>
+        </p:nvSpPr>
+        <p:spPr/>
+        <p:txBody>
+          <a:bodyPr/>
+          <a:lstStyle/>
+          <a:p>
             <a:pPr marL="0" marR="0" lvl="0" indent="0" algn="l" defTabSz="914400" rtl="0" eaLnBrk="1" fontAlgn="auto" latinLnBrk="0" hangingPunct="1">
               <a:lnSpc>
                 <a:spcPct val="100000"/>
@@ -1059,7 +1370,7 @@
           <a:p>
             <a:fld id="{807F441D-149E-EA40-A4B4-DBE54466C197}" type="slidenum">
               <a:rPr lang="en-US" smtClean="0"/>
-              <a:t>5</a:t>
+              <a:t>7</a:t>
             </a:fld>
             <a:endParaRPr lang="en-US"/>
           </a:p>
@@ -1800,7 +2111,7 @@
           <a:p>
             <a:fld id="{1160EA64-D806-43AC-9DF2-F8C432F32B4C}" type="datetimeFigureOut">
               <a:rPr lang="en-US" smtClean="0"/>
-              <a:t>12/16/19</a:t>
+              <a:t>12/17/19</a:t>
             </a:fld>
             <a:endParaRPr lang="en-US" dirty="0"/>
           </a:p>
@@ -2052,7 +2363,7 @@
           <a:p>
             <a:fld id="{1160EA64-D806-43AC-9DF2-F8C432F32B4C}" type="datetimeFigureOut">
               <a:rPr lang="en-US" smtClean="0"/>
-              <a:t>12/16/19</a:t>
+              <a:t>12/17/19</a:t>
             </a:fld>
             <a:endParaRPr lang="en-US" dirty="0"/>
           </a:p>
@@ -2368,7 +2679,7 @@
           <a:p>
             <a:fld id="{1160EA64-D806-43AC-9DF2-F8C432F32B4C}" type="datetimeFigureOut">
               <a:rPr lang="en-US" smtClean="0"/>
-              <a:t>12/16/19</a:t>
+              <a:t>12/17/19</a:t>
             </a:fld>
             <a:endParaRPr lang="en-US" dirty="0"/>
           </a:p>
@@ -2711,7 +3022,7 @@
           <a:p>
             <a:fld id="{1160EA64-D806-43AC-9DF2-F8C432F32B4C}" type="datetimeFigureOut">
               <a:rPr lang="en-US" smtClean="0"/>
-              <a:t>12/16/19</a:t>
+              <a:t>12/17/19</a:t>
             </a:fld>
             <a:endParaRPr lang="en-US" dirty="0"/>
           </a:p>
@@ -3027,7 +3338,7 @@
           <a:p>
             <a:fld id="{1160EA64-D806-43AC-9DF2-F8C432F32B4C}" type="datetimeFigureOut">
               <a:rPr lang="en-US" smtClean="0"/>
-              <a:t>12/16/19</a:t>
+              <a:t>12/17/19</a:t>
             </a:fld>
             <a:endParaRPr lang="en-US" dirty="0"/>
           </a:p>
@@ -3422,7 +3733,7 @@
           <a:p>
             <a:fld id="{1160EA64-D806-43AC-9DF2-F8C432F32B4C}" type="datetimeFigureOut">
               <a:rPr lang="en-US" smtClean="0"/>
-              <a:t>12/16/19</a:t>
+              <a:t>12/17/19</a:t>
             </a:fld>
             <a:endParaRPr lang="en-US" dirty="0"/>
           </a:p>
@@ -3594,7 +3905,7 @@
           <a:p>
             <a:fld id="{E9F9C37B-1D36-470B-8223-D6C91242EC14}" type="datetimeFigureOut">
               <a:rPr lang="en-US" smtClean="0"/>
-              <a:t>12/16/19</a:t>
+              <a:t>12/17/19</a:t>
             </a:fld>
             <a:endParaRPr lang="en-US" dirty="0"/>
           </a:p>
@@ -3774,7 +4085,7 @@
           <a:p>
             <a:fld id="{67C6F52A-A82B-47A2-A83A-8C4C91F2D59F}" type="datetimeFigureOut">
               <a:rPr lang="en-US" smtClean="0"/>
-              <a:t>12/16/19</a:t>
+              <a:t>12/17/19</a:t>
             </a:fld>
             <a:endParaRPr lang="en-US" dirty="0"/>
           </a:p>
@@ -3950,7 +4261,7 @@
           <a:p>
             <a:fld id="{F070A7B3-6521-4DCA-87E5-044747A908C1}" type="datetimeFigureOut">
               <a:rPr lang="en-US" smtClean="0"/>
-              <a:t>12/16/19</a:t>
+              <a:t>12/17/19</a:t>
             </a:fld>
             <a:endParaRPr lang="en-US" dirty="0"/>
           </a:p>
@@ -4198,7 +4509,7 @@
           <a:p>
             <a:fld id="{1160EA64-D806-43AC-9DF2-F8C432F32B4C}" type="datetimeFigureOut">
               <a:rPr lang="en-US" smtClean="0"/>
-              <a:t>12/16/19</a:t>
+              <a:t>12/17/19</a:t>
             </a:fld>
             <a:endParaRPr lang="en-US" dirty="0"/>
           </a:p>
@@ -4431,7 +4742,7 @@
           <a:p>
             <a:fld id="{AB134690-1557-4C89-A502-4959FE7FAD70}" type="datetimeFigureOut">
               <a:rPr lang="en-US" smtClean="0"/>
-              <a:t>12/16/19</a:t>
+              <a:t>12/17/19</a:t>
             </a:fld>
             <a:endParaRPr lang="en-US" dirty="0"/>
           </a:p>
@@ -4805,7 +5116,7 @@
           <a:p>
             <a:fld id="{1160EA64-D806-43AC-9DF2-F8C432F32B4C}" type="datetimeFigureOut">
               <a:rPr lang="en-US" smtClean="0"/>
-              <a:t>12/16/19</a:t>
+              <a:t>12/17/19</a:t>
             </a:fld>
             <a:endParaRPr lang="en-US" dirty="0"/>
           </a:p>
@@ -4930,7 +5241,7 @@
           <a:p>
             <a:fld id="{E1037C31-9E7A-4F99-8774-A0E530DE1A42}" type="datetimeFigureOut">
               <a:rPr lang="en-US" smtClean="0"/>
-              <a:t>12/16/19</a:t>
+              <a:t>12/17/19</a:t>
             </a:fld>
             <a:endParaRPr lang="en-US" dirty="0"/>
           </a:p>
@@ -5025,7 +5336,7 @@
           <a:p>
             <a:fld id="{C278504F-A551-4DE0-9316-4DCD1D8CC752}" type="datetimeFigureOut">
               <a:rPr lang="en-US" smtClean="0"/>
-              <a:t>12/16/19</a:t>
+              <a:t>12/17/19</a:t>
             </a:fld>
             <a:endParaRPr lang="en-US" dirty="0"/>
           </a:p>
@@ -5280,7 +5591,7 @@
           <a:p>
             <a:fld id="{D1BE4249-C0D0-4B06-8692-E8BB871AF643}" type="datetimeFigureOut">
               <a:rPr lang="en-US" smtClean="0"/>
-              <a:t>12/16/19</a:t>
+              <a:t>12/17/19</a:t>
             </a:fld>
             <a:endParaRPr lang="en-US" dirty="0"/>
           </a:p>
@@ -5543,7 +5854,7 @@
           <a:p>
             <a:fld id="{042B0DB6-F5C7-45FB-8CF3-31B45F9C2DAC}" type="datetimeFigureOut">
               <a:rPr lang="en-US" smtClean="0"/>
-              <a:t>12/16/19</a:t>
+              <a:t>12/17/19</a:t>
             </a:fld>
             <a:endParaRPr lang="en-US" dirty="0"/>
           </a:p>
@@ -6286,7 +6597,7 @@
           <a:p>
             <a:fld id="{1160EA64-D806-43AC-9DF2-F8C432F32B4C}" type="datetimeFigureOut">
               <a:rPr lang="en-US" smtClean="0"/>
-              <a:t>12/16/19</a:t>
+              <a:t>12/17/19</a:t>
             </a:fld>
             <a:endParaRPr lang="en-US" dirty="0"/>
           </a:p>
@@ -6903,7 +7214,7 @@
           <p:cNvPr id="2" name="Title 1">
             <a:extLst>
               <a:ext uri="{FF2B5EF4-FFF2-40B4-BE49-F238E27FC236}">
-                <a16:creationId xmlns:a16="http://schemas.microsoft.com/office/drawing/2014/main" id="{BE7A3271-E087-664D-A558-99E436D9C73E}"/>
+                <a16:creationId xmlns:a16="http://schemas.microsoft.com/office/drawing/2014/main" id="{689EF129-F3C7-9148-90D1-0DFD5C1ABF21}"/>
               </a:ext>
             </a:extLst>
           </p:cNvPr>
@@ -6931,7 +7242,7 @@
           <p:cNvPr id="3" name="Content Placeholder 2">
             <a:extLst>
               <a:ext uri="{FF2B5EF4-FFF2-40B4-BE49-F238E27FC236}">
-                <a16:creationId xmlns:a16="http://schemas.microsoft.com/office/drawing/2014/main" id="{F7ECC7AB-57D6-3A49-8B3A-A002F5F88A5E}"/>
+                <a16:creationId xmlns:a16="http://schemas.microsoft.com/office/drawing/2014/main" id="{9640DDD4-7707-204D-8224-CC76BDEE8CE9}"/>
               </a:ext>
             </a:extLst>
           </p:cNvPr>
@@ -6944,9 +7255,7 @@
         </p:nvSpPr>
         <p:spPr/>
         <p:txBody>
-          <a:bodyPr>
-            <a:normAutofit/>
-          </a:bodyPr>
+          <a:bodyPr/>
           <a:lstStyle/>
           <a:p>
             <a:r>
@@ -6958,42 +7267,21 @@
             <a:pPr lvl="1"/>
             <a:r>
               <a:rPr lang="en-US" dirty="0"/>
-              <a:t>Import/ Export</a:t>
+              <a:t>Intended to quickly clean and manipulate large excel files</a:t>
             </a:r>
           </a:p>
           <a:p>
             <a:pPr lvl="1"/>
             <a:r>
               <a:rPr lang="en-US" dirty="0"/>
-              <a:t>Data validation and cleanup</a:t>
+              <a:t>Use tool without the need to program</a:t>
             </a:r>
           </a:p>
           <a:p>
             <a:pPr lvl="1"/>
             <a:r>
               <a:rPr lang="en-US" dirty="0"/>
-              <a:t>Compressing files</a:t>
-            </a:r>
-          </a:p>
-          <a:p>
-            <a:pPr lvl="1"/>
-            <a:r>
-              <a:rPr lang="en-US" dirty="0"/>
-              <a:t>Sending a copy of a file to a list of email addresses</a:t>
-            </a:r>
-          </a:p>
-          <a:p>
-            <a:pPr lvl="1"/>
-            <a:r>
-              <a:rPr lang="en-US" dirty="0"/>
-              <a:t>Removing duplicate rows based on a set of criteria</a:t>
-            </a:r>
-          </a:p>
-          <a:p>
-            <a:pPr lvl="1"/>
-            <a:r>
-              <a:rPr lang="en-US" dirty="0"/>
-              <a:t>Data analysis</a:t>
+              <a:t>Save time</a:t>
             </a:r>
           </a:p>
         </p:txBody>
@@ -7001,7 +7289,7 @@
     </p:spTree>
     <p:extLst>
       <p:ext uri="{BB962C8B-B14F-4D97-AF65-F5344CB8AC3E}">
-        <p14:creationId xmlns:p14="http://schemas.microsoft.com/office/powerpoint/2010/main" val="3069910592"/>
+        <p14:creationId xmlns:p14="http://schemas.microsoft.com/office/powerpoint/2010/main" val="395814562"/>
       </p:ext>
     </p:extLst>
   </p:cSld>
@@ -7033,7 +7321,7 @@
           <p:cNvPr id="2" name="Title 1">
             <a:extLst>
               <a:ext uri="{FF2B5EF4-FFF2-40B4-BE49-F238E27FC236}">
-                <a16:creationId xmlns:a16="http://schemas.microsoft.com/office/drawing/2014/main" id="{4B052CE8-3DAA-784B-B056-17FA565A43FF}"/>
+                <a16:creationId xmlns:a16="http://schemas.microsoft.com/office/drawing/2014/main" id="{BE7A3271-E087-664D-A558-99E436D9C73E}"/>
               </a:ext>
             </a:extLst>
           </p:cNvPr>
@@ -7051,7 +7339,7 @@
           <a:p>
             <a:r>
               <a:rPr lang="en-US" dirty="0"/>
-              <a:t>Workflow</a:t>
+              <a:t>Layout</a:t>
             </a:r>
           </a:p>
         </p:txBody>
@@ -7061,7 +7349,7 @@
           <p:cNvPr id="3" name="Content Placeholder 2">
             <a:extLst>
               <a:ext uri="{FF2B5EF4-FFF2-40B4-BE49-F238E27FC236}">
-                <a16:creationId xmlns:a16="http://schemas.microsoft.com/office/drawing/2014/main" id="{B6A6B2D3-2F5B-5541-BFD1-C9D7559ADE8C}"/>
+                <a16:creationId xmlns:a16="http://schemas.microsoft.com/office/drawing/2014/main" id="{F7ECC7AB-57D6-3A49-8B3A-A002F5F88A5E}"/>
               </a:ext>
             </a:extLst>
           </p:cNvPr>
@@ -7074,79 +7362,63 @@
         </p:nvSpPr>
         <p:spPr/>
         <p:txBody>
-          <a:bodyPr/>
+          <a:bodyPr>
+            <a:normAutofit/>
+          </a:bodyPr>
           <a:lstStyle/>
           <a:p>
             <a:r>
               <a:rPr lang="en-US" dirty="0"/>
-              <a:t>8 key features integrated into a main</a:t>
+              <a:t>Main Functionality Tools</a:t>
             </a:r>
           </a:p>
           <a:p>
             <a:pPr lvl="1"/>
             <a:r>
-              <a:rPr lang="en-US" dirty="0" err="1"/>
-              <a:t>analysis.py</a:t>
-            </a:r>
-            <a:endParaRPr lang="en-US" dirty="0"/>
+              <a:rPr lang="en-US" dirty="0"/>
+              <a:t>Import and export</a:t>
+            </a:r>
           </a:p>
           <a:p>
             <a:pPr lvl="1"/>
             <a:r>
-              <a:rPr lang="en-US" dirty="0" err="1"/>
-              <a:t>cleanup.py</a:t>
-            </a:r>
-            <a:endParaRPr lang="en-US" dirty="0"/>
+              <a:rPr lang="en-US" dirty="0"/>
+              <a:t>Data validation and cleanup</a:t>
+            </a:r>
           </a:p>
           <a:p>
             <a:pPr lvl="1"/>
             <a:r>
-              <a:rPr lang="en-US" dirty="0" err="1"/>
-              <a:t>compress.py</a:t>
-            </a:r>
-            <a:endParaRPr lang="en-US" dirty="0"/>
+              <a:rPr lang="en-US" dirty="0"/>
+              <a:t>Compressing files</a:t>
+            </a:r>
           </a:p>
           <a:p>
             <a:pPr lvl="1"/>
             <a:r>
-              <a:rPr lang="en-US" dirty="0" err="1"/>
-              <a:t>duplicate_removal.py</a:t>
-            </a:r>
-            <a:endParaRPr lang="en-US" dirty="0"/>
+              <a:rPr lang="en-US" dirty="0"/>
+              <a:t>Sending a copy of a file to a list of email addresses</a:t>
+            </a:r>
           </a:p>
           <a:p>
             <a:pPr lvl="1"/>
             <a:r>
-              <a:rPr lang="en-US" dirty="0" err="1"/>
-              <a:t>file_in.py</a:t>
-            </a:r>
-            <a:endParaRPr lang="en-US" dirty="0"/>
+              <a:rPr lang="en-US" dirty="0"/>
+              <a:t>Removing duplicate rows based on a set of criteria</a:t>
+            </a:r>
           </a:p>
           <a:p>
             <a:pPr lvl="1"/>
             <a:r>
-              <a:rPr lang="en-US" dirty="0" err="1"/>
-              <a:t>file_out.py</a:t>
-            </a:r>
-            <a:endParaRPr lang="en-US" dirty="0"/>
+              <a:rPr lang="en-US" dirty="0"/>
+              <a:t>Data analysis</a:t>
+            </a:r>
           </a:p>
           <a:p>
             <a:pPr lvl="1"/>
             <a:r>
-              <a:rPr lang="en-US" dirty="0" err="1"/>
-              <a:t>graph.py</a:t>
-            </a:r>
-            <a:endParaRPr lang="en-US" dirty="0"/>
-          </a:p>
-          <a:p>
-            <a:pPr lvl="1"/>
-            <a:r>
-              <a:rPr lang="en-US" dirty="0" err="1"/>
-              <a:t>share.py</a:t>
-            </a:r>
-            <a:r>
               <a:rPr lang="en-US" dirty="0"/>
-              <a:t> </a:t>
+              <a:t>Graphing data</a:t>
             </a:r>
           </a:p>
         </p:txBody>
@@ -7154,7 +7426,7 @@
     </p:spTree>
     <p:extLst>
       <p:ext uri="{BB962C8B-B14F-4D97-AF65-F5344CB8AC3E}">
-        <p14:creationId xmlns:p14="http://schemas.microsoft.com/office/powerpoint/2010/main" val="458425556"/>
+        <p14:creationId xmlns:p14="http://schemas.microsoft.com/office/powerpoint/2010/main" val="3069910592"/>
       </p:ext>
     </p:extLst>
   </p:cSld>
@@ -7186,7 +7458,7 @@
           <p:cNvPr id="2" name="Title 1">
             <a:extLst>
               <a:ext uri="{FF2B5EF4-FFF2-40B4-BE49-F238E27FC236}">
-                <a16:creationId xmlns:a16="http://schemas.microsoft.com/office/drawing/2014/main" id="{E5F6B3C0-8391-AA4D-8BA6-99575BACF9E8}"/>
+                <a16:creationId xmlns:a16="http://schemas.microsoft.com/office/drawing/2014/main" id="{4B052CE8-3DAA-784B-B056-17FA565A43FF}"/>
               </a:ext>
             </a:extLst>
           </p:cNvPr>
@@ -7197,31 +7469,117 @@
             <p:ph type="title"/>
           </p:nvPr>
         </p:nvSpPr>
-        <p:spPr>
-          <a:xfrm>
-            <a:off x="665143" y="2879776"/>
-            <a:ext cx="8596668" cy="1098448"/>
-          </a:xfrm>
-        </p:spPr>
-        <p:txBody>
-          <a:bodyPr>
-            <a:normAutofit fontScale="90000"/>
-          </a:bodyPr>
-          <a:lstStyle/>
-          <a:p>
-            <a:pPr algn="ctr"/>
-            <a:r>
-              <a:rPr lang="en-US" sz="7200" dirty="0"/>
-              <a:t>DEMO</a:t>
-            </a:r>
-            <a:endParaRPr lang="en-US" dirty="0"/>
+        <p:spPr/>
+        <p:txBody>
+          <a:bodyPr/>
+          <a:lstStyle/>
+          <a:p>
+            <a:r>
+              <a:rPr lang="en-US" dirty="0"/>
+              <a:t>Workflow</a:t>
+            </a:r>
+          </a:p>
+        </p:txBody>
+      </p:sp>
+      <p:sp>
+        <p:nvSpPr>
+          <p:cNvPr id="3" name="Content Placeholder 2">
+            <a:extLst>
+              <a:ext uri="{FF2B5EF4-FFF2-40B4-BE49-F238E27FC236}">
+                <a16:creationId xmlns:a16="http://schemas.microsoft.com/office/drawing/2014/main" id="{B6A6B2D3-2F5B-5541-BFD1-C9D7559ADE8C}"/>
+              </a:ext>
+            </a:extLst>
+          </p:cNvPr>
+          <p:cNvSpPr>
+            <a:spLocks noGrp="1"/>
+          </p:cNvSpPr>
+          <p:nvPr>
+            <p:ph idx="1"/>
+          </p:nvPr>
+        </p:nvSpPr>
+        <p:spPr/>
+        <p:txBody>
+          <a:bodyPr/>
+          <a:lstStyle/>
+          <a:p>
+            <a:r>
+              <a:rPr lang="en-US" dirty="0"/>
+              <a:t>8 key features integrated into a main</a:t>
+            </a:r>
+          </a:p>
+          <a:p>
+            <a:pPr lvl="1"/>
+            <a:r>
+              <a:rPr lang="en-US" dirty="0" err="1"/>
+              <a:t>analysis.py</a:t>
+            </a:r>
+            <a:endParaRPr lang="en-US" dirty="0"/>
+          </a:p>
+          <a:p>
+            <a:pPr lvl="1"/>
+            <a:r>
+              <a:rPr lang="en-US" dirty="0" err="1"/>
+              <a:t>cleanup.py</a:t>
+            </a:r>
+            <a:endParaRPr lang="en-US" dirty="0"/>
+          </a:p>
+          <a:p>
+            <a:pPr lvl="1"/>
+            <a:r>
+              <a:rPr lang="en-US" dirty="0" err="1"/>
+              <a:t>compress.py</a:t>
+            </a:r>
+            <a:endParaRPr lang="en-US" dirty="0"/>
+          </a:p>
+          <a:p>
+            <a:pPr lvl="1"/>
+            <a:r>
+              <a:rPr lang="en-US" dirty="0" err="1"/>
+              <a:t>duplicate_removal.py</a:t>
+            </a:r>
+            <a:endParaRPr lang="en-US" dirty="0"/>
+          </a:p>
+          <a:p>
+            <a:pPr lvl="1"/>
+            <a:r>
+              <a:rPr lang="en-US" dirty="0" err="1"/>
+              <a:t>file_in.py</a:t>
+            </a:r>
+            <a:endParaRPr lang="en-US" dirty="0"/>
+          </a:p>
+          <a:p>
+            <a:pPr lvl="1"/>
+            <a:r>
+              <a:rPr lang="en-US" dirty="0" err="1"/>
+              <a:t>file_out.py</a:t>
+            </a:r>
+            <a:endParaRPr lang="en-US" dirty="0"/>
+          </a:p>
+          <a:p>
+            <a:pPr lvl="1"/>
+            <a:r>
+              <a:rPr lang="en-US" dirty="0" err="1"/>
+              <a:t>graph.py</a:t>
+            </a:r>
+            <a:endParaRPr lang="en-US" dirty="0"/>
+          </a:p>
+          <a:p>
+            <a:pPr lvl="1"/>
+            <a:r>
+              <a:rPr lang="en-US" dirty="0" err="1"/>
+              <a:t>share.py</a:t>
+            </a:r>
+            <a:r>
+              <a:rPr lang="en-US" dirty="0"/>
+              <a:t> </a:t>
+            </a:r>
           </a:p>
         </p:txBody>
       </p:sp>
     </p:spTree>
     <p:extLst>
       <p:ext uri="{BB962C8B-B14F-4D97-AF65-F5344CB8AC3E}">
-        <p14:creationId xmlns:p14="http://schemas.microsoft.com/office/powerpoint/2010/main" val="929738553"/>
+        <p14:creationId xmlns:p14="http://schemas.microsoft.com/office/powerpoint/2010/main" val="458425556"/>
       </p:ext>
     </p:extLst>
   </p:cSld>
@@ -7253,6 +7611,207 @@
           <p:cNvPr id="2" name="Title 1">
             <a:extLst>
               <a:ext uri="{FF2B5EF4-FFF2-40B4-BE49-F238E27FC236}">
+                <a16:creationId xmlns:a16="http://schemas.microsoft.com/office/drawing/2014/main" id="{229B61CD-687A-0441-8727-6B121BC64B5C}"/>
+              </a:ext>
+            </a:extLst>
+          </p:cNvPr>
+          <p:cNvSpPr>
+            <a:spLocks noGrp="1"/>
+          </p:cNvSpPr>
+          <p:nvPr>
+            <p:ph type="title"/>
+          </p:nvPr>
+        </p:nvSpPr>
+        <p:spPr/>
+        <p:txBody>
+          <a:bodyPr/>
+          <a:lstStyle/>
+          <a:p>
+            <a:r>
+              <a:rPr lang="en-US" dirty="0"/>
+              <a:t>Workflow</a:t>
+            </a:r>
+          </a:p>
+        </p:txBody>
+      </p:sp>
+      <p:sp>
+        <p:nvSpPr>
+          <p:cNvPr id="3" name="Content Placeholder 2">
+            <a:extLst>
+              <a:ext uri="{FF2B5EF4-FFF2-40B4-BE49-F238E27FC236}">
+                <a16:creationId xmlns:a16="http://schemas.microsoft.com/office/drawing/2014/main" id="{D2A0935E-EAD6-F946-8A32-311BD51963E8}"/>
+              </a:ext>
+            </a:extLst>
+          </p:cNvPr>
+          <p:cNvSpPr>
+            <a:spLocks noGrp="1"/>
+          </p:cNvSpPr>
+          <p:nvPr>
+            <p:ph idx="1"/>
+          </p:nvPr>
+        </p:nvSpPr>
+        <p:spPr/>
+        <p:txBody>
+          <a:bodyPr/>
+          <a:lstStyle/>
+          <a:p>
+            <a:r>
+              <a:rPr lang="en-US" dirty="0"/>
+              <a:t>Utility tools</a:t>
+            </a:r>
+          </a:p>
+          <a:p>
+            <a:pPr lvl="1"/>
+            <a:r>
+              <a:rPr lang="en-US" dirty="0" err="1"/>
+              <a:t>custom_dictionaries.py</a:t>
+            </a:r>
+            <a:endParaRPr lang="en-US" dirty="0"/>
+          </a:p>
+          <a:p>
+            <a:pPr lvl="1"/>
+            <a:r>
+              <a:rPr lang="en-US" dirty="0" err="1"/>
+              <a:t>custom_regular_expression.py</a:t>
+            </a:r>
+            <a:endParaRPr lang="en-US" dirty="0"/>
+          </a:p>
+          <a:p>
+            <a:pPr lvl="1"/>
+            <a:r>
+              <a:rPr lang="en-US" dirty="0" err="1"/>
+              <a:t>excel_funcs.py</a:t>
+            </a:r>
+            <a:endParaRPr lang="en-US" dirty="0"/>
+          </a:p>
+          <a:p>
+            <a:pPr lvl="1"/>
+            <a:r>
+              <a:rPr lang="en-US" dirty="0" err="1"/>
+              <a:t>menus.py</a:t>
+            </a:r>
+            <a:endParaRPr lang="en-US" dirty="0"/>
+          </a:p>
+          <a:p>
+            <a:pPr lvl="1"/>
+            <a:r>
+              <a:rPr lang="en-US" dirty="0" err="1"/>
+              <a:t>menu_info.py</a:t>
+            </a:r>
+            <a:endParaRPr lang="en-US" dirty="0"/>
+          </a:p>
+          <a:p>
+            <a:pPr lvl="1"/>
+            <a:r>
+              <a:rPr lang="en-US" dirty="0" err="1"/>
+              <a:t>quit.py</a:t>
+            </a:r>
+            <a:endParaRPr lang="en-US" dirty="0"/>
+          </a:p>
+        </p:txBody>
+      </p:sp>
+    </p:spTree>
+    <p:extLst>
+      <p:ext uri="{BB962C8B-B14F-4D97-AF65-F5344CB8AC3E}">
+        <p14:creationId xmlns:p14="http://schemas.microsoft.com/office/powerpoint/2010/main" val="1028623844"/>
+      </p:ext>
+    </p:extLst>
+  </p:cSld>
+  <p:clrMapOvr>
+    <a:masterClrMapping/>
+  </p:clrMapOvr>
+</p:sld>
+</file>
+
+<file path=ppt/slides/slide6.xml><?xml version="1.0" encoding="utf-8"?>
+<p:sld xmlns:a="http://schemas.openxmlformats.org/drawingml/2006/main" xmlns:r="http://schemas.openxmlformats.org/officeDocument/2006/relationships" xmlns:p="http://schemas.openxmlformats.org/presentationml/2006/main">
+  <p:cSld>
+    <p:spTree>
+      <p:nvGrpSpPr>
+        <p:cNvPr id="1" name=""/>
+        <p:cNvGrpSpPr/>
+        <p:nvPr/>
+      </p:nvGrpSpPr>
+      <p:grpSpPr>
+        <a:xfrm>
+          <a:off x="0" y="0"/>
+          <a:ext cx="0" cy="0"/>
+          <a:chOff x="0" y="0"/>
+          <a:chExt cx="0" cy="0"/>
+        </a:xfrm>
+      </p:grpSpPr>
+      <p:sp>
+        <p:nvSpPr>
+          <p:cNvPr id="2" name="Title 1">
+            <a:extLst>
+              <a:ext uri="{FF2B5EF4-FFF2-40B4-BE49-F238E27FC236}">
+                <a16:creationId xmlns:a16="http://schemas.microsoft.com/office/drawing/2014/main" id="{E5F6B3C0-8391-AA4D-8BA6-99575BACF9E8}"/>
+              </a:ext>
+            </a:extLst>
+          </p:cNvPr>
+          <p:cNvSpPr>
+            <a:spLocks noGrp="1"/>
+          </p:cNvSpPr>
+          <p:nvPr>
+            <p:ph type="title"/>
+          </p:nvPr>
+        </p:nvSpPr>
+        <p:spPr>
+          <a:xfrm>
+            <a:off x="665143" y="2879776"/>
+            <a:ext cx="8596668" cy="1098448"/>
+          </a:xfrm>
+        </p:spPr>
+        <p:txBody>
+          <a:bodyPr>
+            <a:normAutofit fontScale="90000"/>
+          </a:bodyPr>
+          <a:lstStyle/>
+          <a:p>
+            <a:pPr algn="ctr"/>
+            <a:r>
+              <a:rPr lang="en-US" sz="7200" dirty="0"/>
+              <a:t>DEMO</a:t>
+            </a:r>
+            <a:endParaRPr lang="en-US" dirty="0"/>
+          </a:p>
+        </p:txBody>
+      </p:sp>
+    </p:spTree>
+    <p:extLst>
+      <p:ext uri="{BB962C8B-B14F-4D97-AF65-F5344CB8AC3E}">
+        <p14:creationId xmlns:p14="http://schemas.microsoft.com/office/powerpoint/2010/main" val="929738553"/>
+      </p:ext>
+    </p:extLst>
+  </p:cSld>
+  <p:clrMapOvr>
+    <a:masterClrMapping/>
+  </p:clrMapOvr>
+</p:sld>
+</file>
+
+<file path=ppt/slides/slide7.xml><?xml version="1.0" encoding="utf-8"?>
+<p:sld xmlns:a="http://schemas.openxmlformats.org/drawingml/2006/main" xmlns:r="http://schemas.openxmlformats.org/officeDocument/2006/relationships" xmlns:p="http://schemas.openxmlformats.org/presentationml/2006/main">
+  <p:cSld>
+    <p:spTree>
+      <p:nvGrpSpPr>
+        <p:cNvPr id="1" name=""/>
+        <p:cNvGrpSpPr/>
+        <p:nvPr/>
+      </p:nvGrpSpPr>
+      <p:grpSpPr>
+        <a:xfrm>
+          <a:off x="0" y="0"/>
+          <a:ext cx="0" cy="0"/>
+          <a:chOff x="0" y="0"/>
+          <a:chExt cx="0" cy="0"/>
+        </a:xfrm>
+      </p:grpSpPr>
+      <p:sp>
+        <p:nvSpPr>
+          <p:cNvPr id="2" name="Title 1">
+            <a:extLst>
+              <a:ext uri="{FF2B5EF4-FFF2-40B4-BE49-F238E27FC236}">
                 <a16:creationId xmlns:a16="http://schemas.microsoft.com/office/drawing/2014/main" id="{A58C43DC-1C9E-4043-BF54-9C5CBDF870C9}"/>
               </a:ext>
             </a:extLst>
@@ -7331,6 +7890,29 @@
               <a:t>export.py</a:t>
             </a:r>
             <a:endParaRPr lang="en-US" dirty="0"/>
+          </a:p>
+          <a:p>
+            <a:r>
+              <a:rPr lang="en-US" dirty="0"/>
+              <a:t>Expanding </a:t>
+            </a:r>
+            <a:r>
+              <a:rPr lang="en-US" dirty="0" err="1"/>
+              <a:t>duplicate_removal.py</a:t>
+            </a:r>
+            <a:endParaRPr lang="en-US" dirty="0"/>
+          </a:p>
+          <a:p>
+            <a:r>
+              <a:rPr lang="en-US" dirty="0"/>
+              <a:t>Standardizing code further</a:t>
+            </a:r>
+          </a:p>
+          <a:p>
+            <a:r>
+              <a:rPr lang="en-US" dirty="0"/>
+              <a:t>Reducing dependences OR creating setup file</a:t>
+            </a:r>
           </a:p>
         </p:txBody>
       </p:sp>

</xml_diff>